<commit_message>
Adding AJ's changes to the repo.
</commit_message>
<xml_diff>
--- a/idea_presentation/idea_presentation.pptx
+++ b/idea_presentation/idea_presentation.pptx
@@ -13,10 +13,11 @@
     <p:sldId id="269" r:id="rId7"/>
     <p:sldId id="260" r:id="rId8"/>
     <p:sldId id="261" r:id="rId9"/>
-    <p:sldId id="263" r:id="rId10"/>
-    <p:sldId id="264" r:id="rId11"/>
-    <p:sldId id="262" r:id="rId12"/>
-    <p:sldId id="258" r:id="rId13"/>
+    <p:sldId id="270" r:id="rId10"/>
+    <p:sldId id="263" r:id="rId11"/>
+    <p:sldId id="264" r:id="rId12"/>
+    <p:sldId id="262" r:id="rId13"/>
+    <p:sldId id="258" r:id="rId14"/>
   </p:sldIdLst>
   <p:sldSz cx="9144000" cy="6858000" type="screen4x3"/>
   <p:notesSz cx="6858000" cy="9144000"/>
@@ -4257,11 +4258,11 @@
           <a:p>
             <a:r>
               <a:rPr lang="en-US" dirty="0"/>
-              <a:t>Attack Model </a:t>
+              <a:t>Attack </a:t>
             </a:r>
             <a:r>
               <a:rPr lang="en-US" dirty="0" smtClean="0"/>
-              <a:t>(Results)</a:t>
+              <a:t>Model (Exploitation)</a:t>
             </a:r>
             <a:endParaRPr lang="en-US" dirty="0"/>
           </a:p>
@@ -4284,136 +4285,41 @@
           <a:p>
             <a:r>
               <a:rPr lang="en-US" dirty="0" smtClean="0"/>
-              <a:t>Data loss</a:t>
-            </a:r>
-          </a:p>
-          <a:p>
-            <a:pPr lvl="1"/>
+              <a:t>The </a:t>
+            </a:r>
+            <a:r>
+              <a:rPr lang="en-US" dirty="0" smtClean="0">
+                <a:solidFill>
+                  <a:srgbClr val="FF0000"/>
+                </a:solidFill>
+              </a:rPr>
+              <a:t>captured node </a:t>
+            </a:r>
             <a:r>
               <a:rPr lang="en-US" dirty="0" smtClean="0"/>
-              <a:t>Packets never reach their destination.</a:t>
-            </a:r>
-          </a:p>
-          <a:p>
-            <a:pPr lvl="1"/>
-            <a:endParaRPr lang="en-US" dirty="0" smtClean="0"/>
-          </a:p>
-          <a:p>
-            <a:pPr lvl="1"/>
-            <a:endParaRPr lang="en-US" dirty="0" smtClean="0"/>
-          </a:p>
-          <a:p>
-            <a:r>
-              <a:rPr lang="en-US" dirty="0" smtClean="0"/>
-              <a:t>Energy loss</a:t>
-            </a:r>
-          </a:p>
-          <a:p>
-            <a:pPr lvl="1"/>
-            <a:r>
-              <a:rPr lang="en-US" dirty="0" smtClean="0"/>
-              <a:t>Nodes waste energy on radio communication.</a:t>
+              <a:t>drops all packets rather than forwarding them.</a:t>
             </a:r>
             <a:endParaRPr lang="en-US" dirty="0"/>
           </a:p>
         </p:txBody>
       </p:sp>
-      <p:pic>
-        <p:nvPicPr>
-          <p:cNvPr id="1026" name="Picture 2" descr="battery fast charging anim by Keistutis"/>
-          <p:cNvPicPr>
-            <a:picLocks noChangeAspect="1" noChangeArrowheads="1"/>
-          </p:cNvPicPr>
-          <p:nvPr/>
-        </p:nvPicPr>
-        <p:blipFill>
-          <a:blip r:embed="rId2" cstate="print">
-            <a:extLst>
-              <a:ext uri="{28A0092B-C50C-407E-A947-70E740481C1C}">
-                <a14:useLocalDpi xmlns:a14="http://schemas.microsoft.com/office/drawing/2010/main" val="0"/>
-              </a:ext>
-            </a:extLst>
-          </a:blip>
-          <a:srcRect/>
-          <a:stretch>
-            <a:fillRect/>
-          </a:stretch>
-        </p:blipFill>
-        <p:spPr bwMode="auto">
-          <a:xfrm>
-            <a:off x="5257800" y="5350571"/>
-            <a:ext cx="1993278" cy="732530"/>
-          </a:xfrm>
-          <a:prstGeom prst="rect">
-            <a:avLst/>
-          </a:prstGeom>
-          <a:noFill/>
-          <a:extLst>
-            <a:ext uri="{909E8E84-426E-40DD-AFC4-6F175D3DCCD1}">
-              <a14:hiddenFill xmlns:a14="http://schemas.microsoft.com/office/drawing/2010/main">
-                <a:solidFill>
-                  <a:srgbClr val="FFFFFF"/>
-                </a:solidFill>
-              </a14:hiddenFill>
-            </a:ext>
-          </a:extLst>
-        </p:spPr>
-      </p:pic>
-      <p:pic>
-        <p:nvPicPr>
-          <p:cNvPr id="1028" name="Picture 4" descr="Cell Site Transmitter by GR8DAN"/>
-          <p:cNvPicPr>
-            <a:picLocks noChangeAspect="1" noChangeArrowheads="1"/>
-          </p:cNvPicPr>
-          <p:nvPr/>
-        </p:nvPicPr>
-        <p:blipFill>
-          <a:blip r:embed="rId3" cstate="print">
-            <a:extLst>
-              <a:ext uri="{28A0092B-C50C-407E-A947-70E740481C1C}">
-                <a14:useLocalDpi xmlns:a14="http://schemas.microsoft.com/office/drawing/2010/main" val="0"/>
-              </a:ext>
-            </a:extLst>
-          </a:blip>
-          <a:srcRect/>
-          <a:stretch>
-            <a:fillRect/>
-          </a:stretch>
-        </p:blipFill>
-        <p:spPr bwMode="auto">
-          <a:xfrm>
-            <a:off x="1371600" y="5025823"/>
-            <a:ext cx="1686945" cy="1613889"/>
-          </a:xfrm>
-          <a:prstGeom prst="rect">
-            <a:avLst/>
-          </a:prstGeom>
-          <a:noFill/>
-          <a:extLst>
-            <a:ext uri="{909E8E84-426E-40DD-AFC4-6F175D3DCCD1}">
-              <a14:hiddenFill xmlns:a14="http://schemas.microsoft.com/office/drawing/2010/main">
-                <a:solidFill>
-                  <a:srgbClr val="FFFFFF"/>
-                </a:solidFill>
-              </a14:hiddenFill>
-            </a:ext>
-          </a:extLst>
-        </p:spPr>
-      </p:pic>
-      <p:sp>
-        <p:nvSpPr>
-          <p:cNvPr id="4" name="Right Arrow 3"/>
-          <p:cNvSpPr/>
-          <p:nvPr/>
-        </p:nvSpPr>
-        <p:spPr>
-          <a:xfrm>
-            <a:off x="3429000" y="5562600"/>
-            <a:ext cx="1130808" cy="484632"/>
-          </a:xfrm>
-          <a:prstGeom prst="rightArrow">
-            <a:avLst/>
-          </a:prstGeom>
+      <p:sp>
+        <p:nvSpPr>
+          <p:cNvPr id="31" name="Oval 30"/>
+          <p:cNvSpPr/>
+          <p:nvPr/>
+        </p:nvSpPr>
+        <p:spPr>
+          <a:xfrm>
+            <a:off x="762000" y="4343400"/>
+            <a:ext cx="228600" cy="228600"/>
+          </a:xfrm>
+          <a:prstGeom prst="ellipse">
+            <a:avLst/>
+          </a:prstGeom>
+          <a:solidFill>
+            <a:srgbClr val="00B0F0"/>
+          </a:solidFill>
         </p:spPr>
         <p:style>
           <a:lnRef idx="2">
@@ -4436,63 +4342,26 @@
           <a:lstStyle/>
           <a:p>
             <a:pPr algn="ctr"/>
-            <a:endParaRPr lang="en-US"/>
-          </a:p>
-        </p:txBody>
-      </p:sp>
-      <p:pic>
-        <p:nvPicPr>
-          <p:cNvPr id="1030" name="Picture 6" descr="Unread mail icon by jean_victor_balin"/>
-          <p:cNvPicPr>
-            <a:picLocks noChangeAspect="1" noChangeArrowheads="1"/>
-          </p:cNvPicPr>
-          <p:nvPr/>
-        </p:nvPicPr>
-        <p:blipFill>
-          <a:blip r:embed="rId4" cstate="print">
-            <a:extLst>
-              <a:ext uri="{28A0092B-C50C-407E-A947-70E740481C1C}">
-                <a14:useLocalDpi xmlns:a14="http://schemas.microsoft.com/office/drawing/2010/main" val="0"/>
-              </a:ext>
-            </a:extLst>
-          </a:blip>
-          <a:srcRect/>
-          <a:stretch>
-            <a:fillRect/>
-          </a:stretch>
-        </p:blipFill>
-        <p:spPr bwMode="auto">
-          <a:xfrm>
-            <a:off x="1981200" y="3322830"/>
-            <a:ext cx="872303" cy="623697"/>
-          </a:xfrm>
-          <a:prstGeom prst="rect">
-            <a:avLst/>
-          </a:prstGeom>
-          <a:noFill/>
-          <a:extLst>
-            <a:ext uri="{909E8E84-426E-40DD-AFC4-6F175D3DCCD1}">
-              <a14:hiddenFill xmlns:a14="http://schemas.microsoft.com/office/drawing/2010/main">
-                <a:solidFill>
-                  <a:srgbClr val="FFFFFF"/>
-                </a:solidFill>
-              </a14:hiddenFill>
-            </a:ext>
-          </a:extLst>
-        </p:spPr>
-      </p:pic>
-      <p:sp>
-        <p:nvSpPr>
-          <p:cNvPr id="8" name="Right Arrow 7"/>
-          <p:cNvSpPr/>
-          <p:nvPr/>
-        </p:nvSpPr>
-        <p:spPr>
-          <a:xfrm>
-            <a:off x="3352800" y="3392364"/>
-            <a:ext cx="1130808" cy="484632"/>
-          </a:xfrm>
-          <a:prstGeom prst="rightArrow">
+            <a:r>
+              <a:rPr lang="en-US" dirty="0" smtClean="0"/>
+              <a:t>A</a:t>
+            </a:r>
+            <a:endParaRPr lang="en-US" dirty="0"/>
+          </a:p>
+        </p:txBody>
+      </p:sp>
+      <p:sp>
+        <p:nvSpPr>
+          <p:cNvPr id="33" name="Oval 32"/>
+          <p:cNvSpPr/>
+          <p:nvPr/>
+        </p:nvSpPr>
+        <p:spPr>
+          <a:xfrm>
+            <a:off x="1295400" y="5257800"/>
+            <a:ext cx="228600" cy="228600"/>
+          </a:xfrm>
+          <a:prstGeom prst="ellipse">
             <a:avLst/>
           </a:prstGeom>
         </p:spPr>
@@ -4521,51 +4390,889 @@
           </a:p>
         </p:txBody>
       </p:sp>
-      <p:pic>
-        <p:nvPicPr>
-          <p:cNvPr id="1032" name="Picture 8" descr="Trash Can by Andy"/>
-          <p:cNvPicPr>
-            <a:picLocks noChangeAspect="1" noChangeArrowheads="1"/>
-          </p:cNvPicPr>
-          <p:nvPr/>
-        </p:nvPicPr>
-        <p:blipFill>
-          <a:blip r:embed="rId5" cstate="print">
-            <a:extLst>
-              <a:ext uri="{28A0092B-C50C-407E-A947-70E740481C1C}">
-                <a14:useLocalDpi xmlns:a14="http://schemas.microsoft.com/office/drawing/2010/main" val="0"/>
-              </a:ext>
-            </a:extLst>
-          </a:blip>
-          <a:srcRect/>
-          <a:stretch>
-            <a:fillRect/>
-          </a:stretch>
-        </p:blipFill>
-        <p:spPr bwMode="auto">
-          <a:xfrm>
-            <a:off x="4915216" y="3227675"/>
-            <a:ext cx="919972" cy="1039525"/>
-          </a:xfrm>
-          <a:prstGeom prst="rect">
-            <a:avLst/>
-          </a:prstGeom>
-          <a:noFill/>
-          <a:extLst>
-            <a:ext uri="{909E8E84-426E-40DD-AFC4-6F175D3DCCD1}">
-              <a14:hiddenFill xmlns:a14="http://schemas.microsoft.com/office/drawing/2010/main">
-                <a:solidFill>
-                  <a:srgbClr val="FFFFFF"/>
-                </a:solidFill>
-              </a14:hiddenFill>
-            </a:ext>
-          </a:extLst>
-        </p:spPr>
-      </p:pic>
+      <p:sp>
+        <p:nvSpPr>
+          <p:cNvPr id="34" name="Oval 33"/>
+          <p:cNvSpPr/>
+          <p:nvPr/>
+        </p:nvSpPr>
+        <p:spPr>
+          <a:xfrm>
+            <a:off x="1600200" y="4038600"/>
+            <a:ext cx="228600" cy="228600"/>
+          </a:xfrm>
+          <a:prstGeom prst="ellipse">
+            <a:avLst/>
+          </a:prstGeom>
+          <a:solidFill>
+            <a:srgbClr val="FF0000"/>
+          </a:solidFill>
+        </p:spPr>
+        <p:style>
+          <a:lnRef idx="2">
+            <a:schemeClr val="accent1">
+              <a:shade val="50000"/>
+            </a:schemeClr>
+          </a:lnRef>
+          <a:fillRef idx="1">
+            <a:schemeClr val="accent1"/>
+          </a:fillRef>
+          <a:effectRef idx="0">
+            <a:schemeClr val="accent1"/>
+          </a:effectRef>
+          <a:fontRef idx="minor">
+            <a:schemeClr val="lt1"/>
+          </a:fontRef>
+        </p:style>
+        <p:txBody>
+          <a:bodyPr rtlCol="0" anchor="ctr"/>
+          <a:lstStyle/>
+          <a:p>
+            <a:pPr algn="ctr"/>
+            <a:endParaRPr lang="en-US"/>
+          </a:p>
+        </p:txBody>
+      </p:sp>
+      <p:sp>
+        <p:nvSpPr>
+          <p:cNvPr id="36" name="Oval 35"/>
+          <p:cNvSpPr/>
+          <p:nvPr/>
+        </p:nvSpPr>
+        <p:spPr>
+          <a:xfrm>
+            <a:off x="1524000" y="4389057"/>
+            <a:ext cx="228600" cy="228600"/>
+          </a:xfrm>
+          <a:prstGeom prst="ellipse">
+            <a:avLst/>
+          </a:prstGeom>
+        </p:spPr>
+        <p:style>
+          <a:lnRef idx="2">
+            <a:schemeClr val="accent1">
+              <a:shade val="50000"/>
+            </a:schemeClr>
+          </a:lnRef>
+          <a:fillRef idx="1">
+            <a:schemeClr val="accent1"/>
+          </a:fillRef>
+          <a:effectRef idx="0">
+            <a:schemeClr val="accent1"/>
+          </a:effectRef>
+          <a:fontRef idx="minor">
+            <a:schemeClr val="lt1"/>
+          </a:fontRef>
+        </p:style>
+        <p:txBody>
+          <a:bodyPr rtlCol="0" anchor="ctr"/>
+          <a:lstStyle/>
+          <a:p>
+            <a:pPr algn="ctr"/>
+            <a:endParaRPr lang="en-US"/>
+          </a:p>
+        </p:txBody>
+      </p:sp>
+      <p:sp>
+        <p:nvSpPr>
+          <p:cNvPr id="38" name="Oval 37"/>
+          <p:cNvSpPr/>
+          <p:nvPr/>
+        </p:nvSpPr>
+        <p:spPr>
+          <a:xfrm>
+            <a:off x="2819400" y="5638800"/>
+            <a:ext cx="228600" cy="228600"/>
+          </a:xfrm>
+          <a:prstGeom prst="ellipse">
+            <a:avLst/>
+          </a:prstGeom>
+        </p:spPr>
+        <p:style>
+          <a:lnRef idx="2">
+            <a:schemeClr val="accent1">
+              <a:shade val="50000"/>
+            </a:schemeClr>
+          </a:lnRef>
+          <a:fillRef idx="1">
+            <a:schemeClr val="accent1"/>
+          </a:fillRef>
+          <a:effectRef idx="0">
+            <a:schemeClr val="accent1"/>
+          </a:effectRef>
+          <a:fontRef idx="minor">
+            <a:schemeClr val="lt1"/>
+          </a:fontRef>
+        </p:style>
+        <p:txBody>
+          <a:bodyPr rtlCol="0" anchor="ctr"/>
+          <a:lstStyle/>
+          <a:p>
+            <a:pPr algn="ctr"/>
+            <a:endParaRPr lang="en-US"/>
+          </a:p>
+        </p:txBody>
+      </p:sp>
+      <p:sp>
+        <p:nvSpPr>
+          <p:cNvPr id="40" name="Oval 39"/>
+          <p:cNvSpPr/>
+          <p:nvPr/>
+        </p:nvSpPr>
+        <p:spPr>
+          <a:xfrm>
+            <a:off x="3505200" y="3657600"/>
+            <a:ext cx="228600" cy="228600"/>
+          </a:xfrm>
+          <a:prstGeom prst="ellipse">
+            <a:avLst/>
+          </a:prstGeom>
+        </p:spPr>
+        <p:style>
+          <a:lnRef idx="2">
+            <a:schemeClr val="accent1">
+              <a:shade val="50000"/>
+            </a:schemeClr>
+          </a:lnRef>
+          <a:fillRef idx="1">
+            <a:schemeClr val="accent1"/>
+          </a:fillRef>
+          <a:effectRef idx="0">
+            <a:schemeClr val="accent1"/>
+          </a:effectRef>
+          <a:fontRef idx="minor">
+            <a:schemeClr val="lt1"/>
+          </a:fontRef>
+        </p:style>
+        <p:txBody>
+          <a:bodyPr rtlCol="0" anchor="ctr"/>
+          <a:lstStyle/>
+          <a:p>
+            <a:pPr algn="ctr"/>
+            <a:endParaRPr lang="en-US"/>
+          </a:p>
+        </p:txBody>
+      </p:sp>
+      <p:sp>
+        <p:nvSpPr>
+          <p:cNvPr id="42" name="Oval 41"/>
+          <p:cNvSpPr/>
+          <p:nvPr/>
+        </p:nvSpPr>
+        <p:spPr>
+          <a:xfrm>
+            <a:off x="2362200" y="4458015"/>
+            <a:ext cx="228600" cy="228600"/>
+          </a:xfrm>
+          <a:prstGeom prst="ellipse">
+            <a:avLst/>
+          </a:prstGeom>
+        </p:spPr>
+        <p:style>
+          <a:lnRef idx="2">
+            <a:schemeClr val="accent1">
+              <a:shade val="50000"/>
+            </a:schemeClr>
+          </a:lnRef>
+          <a:fillRef idx="1">
+            <a:schemeClr val="accent1"/>
+          </a:fillRef>
+          <a:effectRef idx="0">
+            <a:schemeClr val="accent1"/>
+          </a:effectRef>
+          <a:fontRef idx="minor">
+            <a:schemeClr val="lt1"/>
+          </a:fontRef>
+        </p:style>
+        <p:txBody>
+          <a:bodyPr rtlCol="0" anchor="ctr"/>
+          <a:lstStyle/>
+          <a:p>
+            <a:pPr algn="ctr"/>
+            <a:endParaRPr lang="en-US"/>
+          </a:p>
+        </p:txBody>
+      </p:sp>
+      <p:sp>
+        <p:nvSpPr>
+          <p:cNvPr id="44" name="Oval 43"/>
+          <p:cNvSpPr/>
+          <p:nvPr/>
+        </p:nvSpPr>
+        <p:spPr>
+          <a:xfrm>
+            <a:off x="4038600" y="5143500"/>
+            <a:ext cx="228600" cy="228600"/>
+          </a:xfrm>
+          <a:prstGeom prst="ellipse">
+            <a:avLst/>
+          </a:prstGeom>
+          <a:solidFill>
+            <a:srgbClr val="FF0000"/>
+          </a:solidFill>
+        </p:spPr>
+        <p:style>
+          <a:lnRef idx="2">
+            <a:schemeClr val="accent1">
+              <a:shade val="50000"/>
+            </a:schemeClr>
+          </a:lnRef>
+          <a:fillRef idx="1">
+            <a:schemeClr val="accent1"/>
+          </a:fillRef>
+          <a:effectRef idx="0">
+            <a:schemeClr val="accent1"/>
+          </a:effectRef>
+          <a:fontRef idx="minor">
+            <a:schemeClr val="lt1"/>
+          </a:fontRef>
+        </p:style>
+        <p:txBody>
+          <a:bodyPr rtlCol="0" anchor="ctr"/>
+          <a:lstStyle/>
+          <a:p>
+            <a:pPr algn="ctr"/>
+            <a:endParaRPr lang="en-US"/>
+          </a:p>
+        </p:txBody>
+      </p:sp>
+      <p:sp>
+        <p:nvSpPr>
+          <p:cNvPr id="45" name="Oval 44"/>
+          <p:cNvSpPr/>
+          <p:nvPr/>
+        </p:nvSpPr>
+        <p:spPr>
+          <a:xfrm>
+            <a:off x="4724400" y="4267200"/>
+            <a:ext cx="228600" cy="228600"/>
+          </a:xfrm>
+          <a:prstGeom prst="ellipse">
+            <a:avLst/>
+          </a:prstGeom>
+          <a:solidFill>
+            <a:srgbClr val="FF0000"/>
+          </a:solidFill>
+        </p:spPr>
+        <p:style>
+          <a:lnRef idx="2">
+            <a:schemeClr val="accent1">
+              <a:shade val="50000"/>
+            </a:schemeClr>
+          </a:lnRef>
+          <a:fillRef idx="1">
+            <a:schemeClr val="accent1"/>
+          </a:fillRef>
+          <a:effectRef idx="0">
+            <a:schemeClr val="accent1"/>
+          </a:effectRef>
+          <a:fontRef idx="minor">
+            <a:schemeClr val="lt1"/>
+          </a:fontRef>
+        </p:style>
+        <p:txBody>
+          <a:bodyPr rtlCol="0" anchor="ctr"/>
+          <a:lstStyle/>
+          <a:p>
+            <a:pPr algn="ctr"/>
+            <a:endParaRPr lang="en-US"/>
+          </a:p>
+        </p:txBody>
+      </p:sp>
+      <p:sp>
+        <p:nvSpPr>
+          <p:cNvPr id="46" name="Oval 45"/>
+          <p:cNvSpPr/>
+          <p:nvPr/>
+        </p:nvSpPr>
+        <p:spPr>
+          <a:xfrm>
+            <a:off x="4168959" y="4724400"/>
+            <a:ext cx="228600" cy="228600"/>
+          </a:xfrm>
+          <a:prstGeom prst="ellipse">
+            <a:avLst/>
+          </a:prstGeom>
+        </p:spPr>
+        <p:style>
+          <a:lnRef idx="2">
+            <a:schemeClr val="accent1">
+              <a:shade val="50000"/>
+            </a:schemeClr>
+          </a:lnRef>
+          <a:fillRef idx="1">
+            <a:schemeClr val="accent1"/>
+          </a:fillRef>
+          <a:effectRef idx="0">
+            <a:schemeClr val="accent1"/>
+          </a:effectRef>
+          <a:fontRef idx="minor">
+            <a:schemeClr val="lt1"/>
+          </a:fontRef>
+        </p:style>
+        <p:txBody>
+          <a:bodyPr rtlCol="0" anchor="ctr"/>
+          <a:lstStyle/>
+          <a:p>
+            <a:pPr algn="ctr"/>
+            <a:endParaRPr lang="en-US"/>
+          </a:p>
+        </p:txBody>
+      </p:sp>
+      <p:sp>
+        <p:nvSpPr>
+          <p:cNvPr id="47" name="Oval 46"/>
+          <p:cNvSpPr/>
+          <p:nvPr/>
+        </p:nvSpPr>
+        <p:spPr>
+          <a:xfrm>
+            <a:off x="5943600" y="5524500"/>
+            <a:ext cx="228600" cy="228600"/>
+          </a:xfrm>
+          <a:prstGeom prst="ellipse">
+            <a:avLst/>
+          </a:prstGeom>
+        </p:spPr>
+        <p:style>
+          <a:lnRef idx="2">
+            <a:schemeClr val="accent1">
+              <a:shade val="50000"/>
+            </a:schemeClr>
+          </a:lnRef>
+          <a:fillRef idx="1">
+            <a:schemeClr val="accent1"/>
+          </a:fillRef>
+          <a:effectRef idx="0">
+            <a:schemeClr val="accent1"/>
+          </a:effectRef>
+          <a:fontRef idx="minor">
+            <a:schemeClr val="lt1"/>
+          </a:fontRef>
+        </p:style>
+        <p:txBody>
+          <a:bodyPr rtlCol="0" anchor="ctr"/>
+          <a:lstStyle/>
+          <a:p>
+            <a:pPr algn="ctr"/>
+            <a:endParaRPr lang="en-US"/>
+          </a:p>
+        </p:txBody>
+      </p:sp>
+      <p:sp>
+        <p:nvSpPr>
+          <p:cNvPr id="48" name="Oval 47"/>
+          <p:cNvSpPr/>
+          <p:nvPr/>
+        </p:nvSpPr>
+        <p:spPr>
+          <a:xfrm>
+            <a:off x="6066087" y="3810315"/>
+            <a:ext cx="228600" cy="228600"/>
+          </a:xfrm>
+          <a:prstGeom prst="ellipse">
+            <a:avLst/>
+          </a:prstGeom>
+        </p:spPr>
+        <p:style>
+          <a:lnRef idx="2">
+            <a:schemeClr val="accent1">
+              <a:shade val="50000"/>
+            </a:schemeClr>
+          </a:lnRef>
+          <a:fillRef idx="1">
+            <a:schemeClr val="accent1"/>
+          </a:fillRef>
+          <a:effectRef idx="0">
+            <a:schemeClr val="accent1"/>
+          </a:effectRef>
+          <a:fontRef idx="minor">
+            <a:schemeClr val="lt1"/>
+          </a:fontRef>
+        </p:style>
+        <p:txBody>
+          <a:bodyPr rtlCol="0" anchor="ctr"/>
+          <a:lstStyle/>
+          <a:p>
+            <a:pPr algn="ctr"/>
+            <a:endParaRPr lang="en-US"/>
+          </a:p>
+        </p:txBody>
+      </p:sp>
+      <p:sp>
+        <p:nvSpPr>
+          <p:cNvPr id="49" name="Oval 48"/>
+          <p:cNvSpPr/>
+          <p:nvPr/>
+        </p:nvSpPr>
+        <p:spPr>
+          <a:xfrm>
+            <a:off x="5257800" y="4838700"/>
+            <a:ext cx="228600" cy="228600"/>
+          </a:xfrm>
+          <a:prstGeom prst="ellipse">
+            <a:avLst/>
+          </a:prstGeom>
+        </p:spPr>
+        <p:style>
+          <a:lnRef idx="2">
+            <a:schemeClr val="accent1">
+              <a:shade val="50000"/>
+            </a:schemeClr>
+          </a:lnRef>
+          <a:fillRef idx="1">
+            <a:schemeClr val="accent1"/>
+          </a:fillRef>
+          <a:effectRef idx="0">
+            <a:schemeClr val="accent1"/>
+          </a:effectRef>
+          <a:fontRef idx="minor">
+            <a:schemeClr val="lt1"/>
+          </a:fontRef>
+        </p:style>
+        <p:txBody>
+          <a:bodyPr rtlCol="0" anchor="ctr"/>
+          <a:lstStyle/>
+          <a:p>
+            <a:pPr algn="ctr"/>
+            <a:endParaRPr lang="en-US"/>
+          </a:p>
+        </p:txBody>
+      </p:sp>
+      <p:sp>
+        <p:nvSpPr>
+          <p:cNvPr id="50" name="Oval 49"/>
+          <p:cNvSpPr/>
+          <p:nvPr/>
+        </p:nvSpPr>
+        <p:spPr>
+          <a:xfrm>
+            <a:off x="3605331" y="4107558"/>
+            <a:ext cx="228600" cy="228600"/>
+          </a:xfrm>
+          <a:prstGeom prst="ellipse">
+            <a:avLst/>
+          </a:prstGeom>
+        </p:spPr>
+        <p:style>
+          <a:lnRef idx="2">
+            <a:schemeClr val="accent1">
+              <a:shade val="50000"/>
+            </a:schemeClr>
+          </a:lnRef>
+          <a:fillRef idx="1">
+            <a:schemeClr val="accent1"/>
+          </a:fillRef>
+          <a:effectRef idx="0">
+            <a:schemeClr val="accent1"/>
+          </a:effectRef>
+          <a:fontRef idx="minor">
+            <a:schemeClr val="lt1"/>
+          </a:fontRef>
+        </p:style>
+        <p:txBody>
+          <a:bodyPr rtlCol="0" anchor="ctr"/>
+          <a:lstStyle/>
+          <a:p>
+            <a:pPr algn="ctr"/>
+            <a:endParaRPr lang="en-US"/>
+          </a:p>
+        </p:txBody>
+      </p:sp>
+      <p:sp>
+        <p:nvSpPr>
+          <p:cNvPr id="51" name="Oval 50"/>
+          <p:cNvSpPr/>
+          <p:nvPr/>
+        </p:nvSpPr>
+        <p:spPr>
+          <a:xfrm>
+            <a:off x="3895961" y="3924615"/>
+            <a:ext cx="228600" cy="228600"/>
+          </a:xfrm>
+          <a:prstGeom prst="ellipse">
+            <a:avLst/>
+          </a:prstGeom>
+        </p:spPr>
+        <p:style>
+          <a:lnRef idx="2">
+            <a:schemeClr val="accent1">
+              <a:shade val="50000"/>
+            </a:schemeClr>
+          </a:lnRef>
+          <a:fillRef idx="1">
+            <a:schemeClr val="accent1"/>
+          </a:fillRef>
+          <a:effectRef idx="0">
+            <a:schemeClr val="accent1"/>
+          </a:effectRef>
+          <a:fontRef idx="minor">
+            <a:schemeClr val="lt1"/>
+          </a:fontRef>
+        </p:style>
+        <p:txBody>
+          <a:bodyPr rtlCol="0" anchor="ctr"/>
+          <a:lstStyle/>
+          <a:p>
+            <a:pPr algn="ctr"/>
+            <a:endParaRPr lang="en-US"/>
+          </a:p>
+        </p:txBody>
+      </p:sp>
+      <p:sp>
+        <p:nvSpPr>
+          <p:cNvPr id="52" name="Oval 51"/>
+          <p:cNvSpPr/>
+          <p:nvPr/>
+        </p:nvSpPr>
+        <p:spPr>
+          <a:xfrm>
+            <a:off x="5829300" y="4595301"/>
+            <a:ext cx="228600" cy="228600"/>
+          </a:xfrm>
+          <a:prstGeom prst="ellipse">
+            <a:avLst/>
+          </a:prstGeom>
+          <a:solidFill>
+            <a:srgbClr val="00B050"/>
+          </a:solidFill>
+        </p:spPr>
+        <p:style>
+          <a:lnRef idx="2">
+            <a:schemeClr val="accent1">
+              <a:shade val="50000"/>
+            </a:schemeClr>
+          </a:lnRef>
+          <a:fillRef idx="1">
+            <a:schemeClr val="accent1"/>
+          </a:fillRef>
+          <a:effectRef idx="0">
+            <a:schemeClr val="accent1"/>
+          </a:effectRef>
+          <a:fontRef idx="minor">
+            <a:schemeClr val="lt1"/>
+          </a:fontRef>
+        </p:style>
+        <p:txBody>
+          <a:bodyPr rtlCol="0" anchor="ctr"/>
+          <a:lstStyle/>
+          <a:p>
+            <a:pPr algn="ctr"/>
+            <a:r>
+              <a:rPr lang="en-US" dirty="0" smtClean="0"/>
+              <a:t>B</a:t>
+            </a:r>
+            <a:endParaRPr lang="en-US" dirty="0"/>
+          </a:p>
+        </p:txBody>
+      </p:sp>
+      <p:sp>
+        <p:nvSpPr>
+          <p:cNvPr id="53" name="Oval 52"/>
+          <p:cNvSpPr/>
+          <p:nvPr/>
+        </p:nvSpPr>
+        <p:spPr>
+          <a:xfrm>
+            <a:off x="7620000" y="5014401"/>
+            <a:ext cx="228600" cy="228600"/>
+          </a:xfrm>
+          <a:prstGeom prst="ellipse">
+            <a:avLst/>
+          </a:prstGeom>
+          <a:solidFill>
+            <a:srgbClr val="FF0000"/>
+          </a:solidFill>
+        </p:spPr>
+        <p:style>
+          <a:lnRef idx="2">
+            <a:schemeClr val="accent1">
+              <a:shade val="50000"/>
+            </a:schemeClr>
+          </a:lnRef>
+          <a:fillRef idx="1">
+            <a:schemeClr val="accent1"/>
+          </a:fillRef>
+          <a:effectRef idx="0">
+            <a:schemeClr val="accent1"/>
+          </a:effectRef>
+          <a:fontRef idx="minor">
+            <a:schemeClr val="lt1"/>
+          </a:fontRef>
+        </p:style>
+        <p:txBody>
+          <a:bodyPr rtlCol="0" anchor="ctr"/>
+          <a:lstStyle/>
+          <a:p>
+            <a:pPr algn="ctr"/>
+            <a:endParaRPr lang="en-US"/>
+          </a:p>
+        </p:txBody>
+      </p:sp>
+      <p:sp>
+        <p:nvSpPr>
+          <p:cNvPr id="54" name="Oval 53"/>
+          <p:cNvSpPr/>
+          <p:nvPr/>
+        </p:nvSpPr>
+        <p:spPr>
+          <a:xfrm>
+            <a:off x="7376916" y="4572000"/>
+            <a:ext cx="228600" cy="228600"/>
+          </a:xfrm>
+          <a:prstGeom prst="ellipse">
+            <a:avLst/>
+          </a:prstGeom>
+        </p:spPr>
+        <p:style>
+          <a:lnRef idx="2">
+            <a:schemeClr val="accent1">
+              <a:shade val="50000"/>
+            </a:schemeClr>
+          </a:lnRef>
+          <a:fillRef idx="1">
+            <a:schemeClr val="accent1"/>
+          </a:fillRef>
+          <a:effectRef idx="0">
+            <a:schemeClr val="accent1"/>
+          </a:effectRef>
+          <a:fontRef idx="minor">
+            <a:schemeClr val="lt1"/>
+          </a:fontRef>
+        </p:style>
+        <p:txBody>
+          <a:bodyPr rtlCol="0" anchor="ctr"/>
+          <a:lstStyle/>
+          <a:p>
+            <a:pPr algn="ctr"/>
+            <a:endParaRPr lang="en-US"/>
+          </a:p>
+        </p:txBody>
+      </p:sp>
+      <p:sp>
+        <p:nvSpPr>
+          <p:cNvPr id="55" name="Oval 54"/>
+          <p:cNvSpPr/>
+          <p:nvPr/>
+        </p:nvSpPr>
+        <p:spPr>
+          <a:xfrm>
+            <a:off x="6781800" y="4153215"/>
+            <a:ext cx="228600" cy="228600"/>
+          </a:xfrm>
+          <a:prstGeom prst="ellipse">
+            <a:avLst/>
+          </a:prstGeom>
+        </p:spPr>
+        <p:style>
+          <a:lnRef idx="2">
+            <a:schemeClr val="accent1">
+              <a:shade val="50000"/>
+            </a:schemeClr>
+          </a:lnRef>
+          <a:fillRef idx="1">
+            <a:schemeClr val="accent1"/>
+          </a:fillRef>
+          <a:effectRef idx="0">
+            <a:schemeClr val="accent1"/>
+          </a:effectRef>
+          <a:fontRef idx="minor">
+            <a:schemeClr val="lt1"/>
+          </a:fontRef>
+        </p:style>
+        <p:txBody>
+          <a:bodyPr rtlCol="0" anchor="ctr"/>
+          <a:lstStyle/>
+          <a:p>
+            <a:pPr algn="ctr"/>
+            <a:endParaRPr lang="en-US"/>
+          </a:p>
+        </p:txBody>
+      </p:sp>
+      <p:cxnSp>
+        <p:nvCxnSpPr>
+          <p:cNvPr id="56" name="Straight Arrow Connector 55"/>
+          <p:cNvCxnSpPr>
+            <a:stCxn id="31" idx="6"/>
+            <a:endCxn id="36" idx="2"/>
+          </p:cNvCxnSpPr>
+          <p:nvPr/>
+        </p:nvCxnSpPr>
+        <p:spPr>
+          <a:xfrm>
+            <a:off x="990600" y="4457700"/>
+            <a:ext cx="533400" cy="45657"/>
+          </a:xfrm>
+          <a:prstGeom prst="straightConnector1">
+            <a:avLst/>
+          </a:prstGeom>
+          <a:ln>
+            <a:tailEnd type="arrow"/>
+          </a:ln>
+        </p:spPr>
+        <p:style>
+          <a:lnRef idx="1">
+            <a:schemeClr val="accent1"/>
+          </a:lnRef>
+          <a:fillRef idx="0">
+            <a:schemeClr val="accent1"/>
+          </a:fillRef>
+          <a:effectRef idx="0">
+            <a:schemeClr val="accent1"/>
+          </a:effectRef>
+          <a:fontRef idx="minor">
+            <a:schemeClr val="tx1"/>
+          </a:fontRef>
+        </p:style>
+      </p:cxnSp>
+      <p:cxnSp>
+        <p:nvCxnSpPr>
+          <p:cNvPr id="57" name="Straight Arrow Connector 56"/>
+          <p:cNvCxnSpPr>
+            <a:stCxn id="36" idx="6"/>
+            <a:endCxn id="42" idx="2"/>
+          </p:cNvCxnSpPr>
+          <p:nvPr/>
+        </p:nvCxnSpPr>
+        <p:spPr>
+          <a:xfrm>
+            <a:off x="1752600" y="4503357"/>
+            <a:ext cx="609600" cy="68958"/>
+          </a:xfrm>
+          <a:prstGeom prst="straightConnector1">
+            <a:avLst/>
+          </a:prstGeom>
+          <a:ln>
+            <a:tailEnd type="arrow"/>
+          </a:ln>
+        </p:spPr>
+        <p:style>
+          <a:lnRef idx="1">
+            <a:schemeClr val="accent1"/>
+          </a:lnRef>
+          <a:fillRef idx="0">
+            <a:schemeClr val="accent1"/>
+          </a:fillRef>
+          <a:effectRef idx="0">
+            <a:schemeClr val="accent1"/>
+          </a:effectRef>
+          <a:fontRef idx="minor">
+            <a:schemeClr val="tx1"/>
+          </a:fontRef>
+        </p:style>
+      </p:cxnSp>
+      <p:cxnSp>
+        <p:nvCxnSpPr>
+          <p:cNvPr id="58" name="Straight Arrow Connector 57"/>
+          <p:cNvCxnSpPr>
+            <a:stCxn id="42" idx="6"/>
+            <a:endCxn id="50" idx="3"/>
+          </p:cNvCxnSpPr>
+          <p:nvPr/>
+        </p:nvCxnSpPr>
+        <p:spPr>
+          <a:xfrm flipV="1">
+            <a:off x="2590800" y="4302680"/>
+            <a:ext cx="1048009" cy="269635"/>
+          </a:xfrm>
+          <a:prstGeom prst="straightConnector1">
+            <a:avLst/>
+          </a:prstGeom>
+          <a:ln>
+            <a:tailEnd type="arrow"/>
+          </a:ln>
+        </p:spPr>
+        <p:style>
+          <a:lnRef idx="1">
+            <a:schemeClr val="accent1"/>
+          </a:lnRef>
+          <a:fillRef idx="0">
+            <a:schemeClr val="accent1"/>
+          </a:fillRef>
+          <a:effectRef idx="0">
+            <a:schemeClr val="accent1"/>
+          </a:effectRef>
+          <a:fontRef idx="minor">
+            <a:schemeClr val="tx1"/>
+          </a:fontRef>
+        </p:style>
+      </p:cxnSp>
+      <p:cxnSp>
+        <p:nvCxnSpPr>
+          <p:cNvPr id="59" name="Straight Arrow Connector 58"/>
+          <p:cNvCxnSpPr>
+            <a:stCxn id="50" idx="7"/>
+            <a:endCxn id="51" idx="3"/>
+          </p:cNvCxnSpPr>
+          <p:nvPr/>
+        </p:nvCxnSpPr>
+        <p:spPr>
+          <a:xfrm flipV="1">
+            <a:off x="3800453" y="4119737"/>
+            <a:ext cx="128986" cy="21299"/>
+          </a:xfrm>
+          <a:prstGeom prst="straightConnector1">
+            <a:avLst/>
+          </a:prstGeom>
+          <a:ln>
+            <a:tailEnd type="arrow"/>
+          </a:ln>
+        </p:spPr>
+        <p:style>
+          <a:lnRef idx="1">
+            <a:schemeClr val="accent1"/>
+          </a:lnRef>
+          <a:fillRef idx="0">
+            <a:schemeClr val="accent1"/>
+          </a:fillRef>
+          <a:effectRef idx="0">
+            <a:schemeClr val="accent1"/>
+          </a:effectRef>
+          <a:fontRef idx="minor">
+            <a:schemeClr val="tx1"/>
+          </a:fontRef>
+        </p:style>
+      </p:cxnSp>
+      <p:cxnSp>
+        <p:nvCxnSpPr>
+          <p:cNvPr id="60" name="Straight Arrow Connector 59"/>
+          <p:cNvCxnSpPr>
+            <a:stCxn id="51" idx="6"/>
+            <a:endCxn id="45" idx="1"/>
+          </p:cNvCxnSpPr>
+          <p:nvPr/>
+        </p:nvCxnSpPr>
+        <p:spPr>
+          <a:xfrm>
+            <a:off x="4124561" y="4038915"/>
+            <a:ext cx="633317" cy="261763"/>
+          </a:xfrm>
+          <a:prstGeom prst="straightConnector1">
+            <a:avLst/>
+          </a:prstGeom>
+          <a:ln>
+            <a:tailEnd type="arrow"/>
+          </a:ln>
+        </p:spPr>
+        <p:style>
+          <a:lnRef idx="1">
+            <a:schemeClr val="accent1"/>
+          </a:lnRef>
+          <a:fillRef idx="0">
+            <a:schemeClr val="accent1"/>
+          </a:fillRef>
+          <a:effectRef idx="0">
+            <a:schemeClr val="accent1"/>
+          </a:effectRef>
+          <a:fontRef idx="minor">
+            <a:schemeClr val="tx1"/>
+          </a:fontRef>
+        </p:style>
+      </p:cxnSp>
     </p:spTree>
     <p:extLst>
       <p:ext uri="{BB962C8B-B14F-4D97-AF65-F5344CB8AC3E}">
-        <p14:creationId xmlns:p14="http://schemas.microsoft.com/office/powerpoint/2010/main" val="104260354"/>
+        <p14:creationId xmlns:p14="http://schemas.microsoft.com/office/powerpoint/2010/main" val="3011107067"/>
       </p:ext>
     </p:extLst>
   </p:cSld>
@@ -4620,6 +5327,370 @@
           <a:lstStyle/>
           <a:p>
             <a:r>
+              <a:rPr lang="en-US" dirty="0"/>
+              <a:t>Attack Model </a:t>
+            </a:r>
+            <a:r>
+              <a:rPr lang="en-US" dirty="0" smtClean="0"/>
+              <a:t>(Results)</a:t>
+            </a:r>
+            <a:endParaRPr lang="en-US" dirty="0"/>
+          </a:p>
+        </p:txBody>
+      </p:sp>
+      <p:sp>
+        <p:nvSpPr>
+          <p:cNvPr id="3" name="Content Placeholder 2"/>
+          <p:cNvSpPr>
+            <a:spLocks noGrp="1"/>
+          </p:cNvSpPr>
+          <p:nvPr>
+            <p:ph idx="1"/>
+          </p:nvPr>
+        </p:nvSpPr>
+        <p:spPr/>
+        <p:txBody>
+          <a:bodyPr/>
+          <a:lstStyle/>
+          <a:p>
+            <a:r>
+              <a:rPr lang="en-US" dirty="0" smtClean="0"/>
+              <a:t>Data loss</a:t>
+            </a:r>
+          </a:p>
+          <a:p>
+            <a:pPr lvl="1"/>
+            <a:r>
+              <a:rPr lang="en-US" dirty="0" smtClean="0"/>
+              <a:t>Packets never reach their destination.</a:t>
+            </a:r>
+          </a:p>
+          <a:p>
+            <a:pPr lvl="1"/>
+            <a:endParaRPr lang="en-US" dirty="0" smtClean="0"/>
+          </a:p>
+          <a:p>
+            <a:pPr lvl="1"/>
+            <a:endParaRPr lang="en-US" dirty="0" smtClean="0"/>
+          </a:p>
+          <a:p>
+            <a:r>
+              <a:rPr lang="en-US" dirty="0" smtClean="0"/>
+              <a:t>Energy loss</a:t>
+            </a:r>
+          </a:p>
+          <a:p>
+            <a:pPr lvl="1"/>
+            <a:r>
+              <a:rPr lang="en-US" dirty="0" smtClean="0"/>
+              <a:t>Nodes waste energy on radio communication.</a:t>
+            </a:r>
+            <a:endParaRPr lang="en-US" dirty="0"/>
+          </a:p>
+        </p:txBody>
+      </p:sp>
+      <p:pic>
+        <p:nvPicPr>
+          <p:cNvPr id="1026" name="Picture 2" descr="battery fast charging anim by Keistutis"/>
+          <p:cNvPicPr>
+            <a:picLocks noChangeAspect="1" noChangeArrowheads="1"/>
+          </p:cNvPicPr>
+          <p:nvPr/>
+        </p:nvPicPr>
+        <p:blipFill>
+          <a:blip r:embed="rId2" cstate="print">
+            <a:extLst>
+              <a:ext uri="{28A0092B-C50C-407E-A947-70E740481C1C}">
+                <a14:useLocalDpi xmlns:a14="http://schemas.microsoft.com/office/drawing/2010/main" val="0"/>
+              </a:ext>
+            </a:extLst>
+          </a:blip>
+          <a:srcRect/>
+          <a:stretch>
+            <a:fillRect/>
+          </a:stretch>
+        </p:blipFill>
+        <p:spPr bwMode="auto">
+          <a:xfrm>
+            <a:off x="5257800" y="5350571"/>
+            <a:ext cx="1993278" cy="732530"/>
+          </a:xfrm>
+          <a:prstGeom prst="rect">
+            <a:avLst/>
+          </a:prstGeom>
+          <a:noFill/>
+          <a:extLst>
+            <a:ext uri="{909E8E84-426E-40DD-AFC4-6F175D3DCCD1}">
+              <a14:hiddenFill xmlns:a14="http://schemas.microsoft.com/office/drawing/2010/main">
+                <a:solidFill>
+                  <a:srgbClr val="FFFFFF"/>
+                </a:solidFill>
+              </a14:hiddenFill>
+            </a:ext>
+          </a:extLst>
+        </p:spPr>
+      </p:pic>
+      <p:pic>
+        <p:nvPicPr>
+          <p:cNvPr id="1028" name="Picture 4" descr="Cell Site Transmitter by GR8DAN"/>
+          <p:cNvPicPr>
+            <a:picLocks noChangeAspect="1" noChangeArrowheads="1"/>
+          </p:cNvPicPr>
+          <p:nvPr/>
+        </p:nvPicPr>
+        <p:blipFill>
+          <a:blip r:embed="rId3" cstate="print">
+            <a:extLst>
+              <a:ext uri="{28A0092B-C50C-407E-A947-70E740481C1C}">
+                <a14:useLocalDpi xmlns:a14="http://schemas.microsoft.com/office/drawing/2010/main" val="0"/>
+              </a:ext>
+            </a:extLst>
+          </a:blip>
+          <a:srcRect/>
+          <a:stretch>
+            <a:fillRect/>
+          </a:stretch>
+        </p:blipFill>
+        <p:spPr bwMode="auto">
+          <a:xfrm>
+            <a:off x="1371600" y="5025823"/>
+            <a:ext cx="1686945" cy="1613889"/>
+          </a:xfrm>
+          <a:prstGeom prst="rect">
+            <a:avLst/>
+          </a:prstGeom>
+          <a:noFill/>
+          <a:extLst>
+            <a:ext uri="{909E8E84-426E-40DD-AFC4-6F175D3DCCD1}">
+              <a14:hiddenFill xmlns:a14="http://schemas.microsoft.com/office/drawing/2010/main">
+                <a:solidFill>
+                  <a:srgbClr val="FFFFFF"/>
+                </a:solidFill>
+              </a14:hiddenFill>
+            </a:ext>
+          </a:extLst>
+        </p:spPr>
+      </p:pic>
+      <p:sp>
+        <p:nvSpPr>
+          <p:cNvPr id="4" name="Right Arrow 3"/>
+          <p:cNvSpPr/>
+          <p:nvPr/>
+        </p:nvSpPr>
+        <p:spPr>
+          <a:xfrm>
+            <a:off x="3429000" y="5562600"/>
+            <a:ext cx="1130808" cy="484632"/>
+          </a:xfrm>
+          <a:prstGeom prst="rightArrow">
+            <a:avLst/>
+          </a:prstGeom>
+        </p:spPr>
+        <p:style>
+          <a:lnRef idx="2">
+            <a:schemeClr val="accent1">
+              <a:shade val="50000"/>
+            </a:schemeClr>
+          </a:lnRef>
+          <a:fillRef idx="1">
+            <a:schemeClr val="accent1"/>
+          </a:fillRef>
+          <a:effectRef idx="0">
+            <a:schemeClr val="accent1"/>
+          </a:effectRef>
+          <a:fontRef idx="minor">
+            <a:schemeClr val="lt1"/>
+          </a:fontRef>
+        </p:style>
+        <p:txBody>
+          <a:bodyPr rtlCol="0" anchor="ctr"/>
+          <a:lstStyle/>
+          <a:p>
+            <a:pPr algn="ctr"/>
+            <a:endParaRPr lang="en-US"/>
+          </a:p>
+        </p:txBody>
+      </p:sp>
+      <p:pic>
+        <p:nvPicPr>
+          <p:cNvPr id="1030" name="Picture 6" descr="Unread mail icon by jean_victor_balin"/>
+          <p:cNvPicPr>
+            <a:picLocks noChangeAspect="1" noChangeArrowheads="1"/>
+          </p:cNvPicPr>
+          <p:nvPr/>
+        </p:nvPicPr>
+        <p:blipFill>
+          <a:blip r:embed="rId4" cstate="print">
+            <a:extLst>
+              <a:ext uri="{28A0092B-C50C-407E-A947-70E740481C1C}">
+                <a14:useLocalDpi xmlns:a14="http://schemas.microsoft.com/office/drawing/2010/main" val="0"/>
+              </a:ext>
+            </a:extLst>
+          </a:blip>
+          <a:srcRect/>
+          <a:stretch>
+            <a:fillRect/>
+          </a:stretch>
+        </p:blipFill>
+        <p:spPr bwMode="auto">
+          <a:xfrm>
+            <a:off x="1981200" y="3322830"/>
+            <a:ext cx="872303" cy="623697"/>
+          </a:xfrm>
+          <a:prstGeom prst="rect">
+            <a:avLst/>
+          </a:prstGeom>
+          <a:noFill/>
+          <a:extLst>
+            <a:ext uri="{909E8E84-426E-40DD-AFC4-6F175D3DCCD1}">
+              <a14:hiddenFill xmlns:a14="http://schemas.microsoft.com/office/drawing/2010/main">
+                <a:solidFill>
+                  <a:srgbClr val="FFFFFF"/>
+                </a:solidFill>
+              </a14:hiddenFill>
+            </a:ext>
+          </a:extLst>
+        </p:spPr>
+      </p:pic>
+      <p:sp>
+        <p:nvSpPr>
+          <p:cNvPr id="8" name="Right Arrow 7"/>
+          <p:cNvSpPr/>
+          <p:nvPr/>
+        </p:nvSpPr>
+        <p:spPr>
+          <a:xfrm>
+            <a:off x="3352800" y="3392364"/>
+            <a:ext cx="1130808" cy="484632"/>
+          </a:xfrm>
+          <a:prstGeom prst="rightArrow">
+            <a:avLst/>
+          </a:prstGeom>
+        </p:spPr>
+        <p:style>
+          <a:lnRef idx="2">
+            <a:schemeClr val="accent1">
+              <a:shade val="50000"/>
+            </a:schemeClr>
+          </a:lnRef>
+          <a:fillRef idx="1">
+            <a:schemeClr val="accent1"/>
+          </a:fillRef>
+          <a:effectRef idx="0">
+            <a:schemeClr val="accent1"/>
+          </a:effectRef>
+          <a:fontRef idx="minor">
+            <a:schemeClr val="lt1"/>
+          </a:fontRef>
+        </p:style>
+        <p:txBody>
+          <a:bodyPr rtlCol="0" anchor="ctr"/>
+          <a:lstStyle/>
+          <a:p>
+            <a:pPr algn="ctr"/>
+            <a:endParaRPr lang="en-US"/>
+          </a:p>
+        </p:txBody>
+      </p:sp>
+      <p:pic>
+        <p:nvPicPr>
+          <p:cNvPr id="1032" name="Picture 8" descr="Trash Can by Andy"/>
+          <p:cNvPicPr>
+            <a:picLocks noChangeAspect="1" noChangeArrowheads="1"/>
+          </p:cNvPicPr>
+          <p:nvPr/>
+        </p:nvPicPr>
+        <p:blipFill>
+          <a:blip r:embed="rId5" cstate="print">
+            <a:extLst>
+              <a:ext uri="{28A0092B-C50C-407E-A947-70E740481C1C}">
+                <a14:useLocalDpi xmlns:a14="http://schemas.microsoft.com/office/drawing/2010/main" val="0"/>
+              </a:ext>
+            </a:extLst>
+          </a:blip>
+          <a:srcRect/>
+          <a:stretch>
+            <a:fillRect/>
+          </a:stretch>
+        </p:blipFill>
+        <p:spPr bwMode="auto">
+          <a:xfrm>
+            <a:off x="4915216" y="3227675"/>
+            <a:ext cx="919972" cy="1039525"/>
+          </a:xfrm>
+          <a:prstGeom prst="rect">
+            <a:avLst/>
+          </a:prstGeom>
+          <a:noFill/>
+          <a:extLst>
+            <a:ext uri="{909E8E84-426E-40DD-AFC4-6F175D3DCCD1}">
+              <a14:hiddenFill xmlns:a14="http://schemas.microsoft.com/office/drawing/2010/main">
+                <a:solidFill>
+                  <a:srgbClr val="FFFFFF"/>
+                </a:solidFill>
+              </a14:hiddenFill>
+            </a:ext>
+          </a:extLst>
+        </p:spPr>
+      </p:pic>
+    </p:spTree>
+    <p:extLst>
+      <p:ext uri="{BB962C8B-B14F-4D97-AF65-F5344CB8AC3E}">
+        <p14:creationId xmlns:p14="http://schemas.microsoft.com/office/powerpoint/2010/main" val="104260354"/>
+      </p:ext>
+    </p:extLst>
+  </p:cSld>
+  <p:clrMapOvr>
+    <a:masterClrMapping/>
+  </p:clrMapOvr>
+  <p:timing>
+    <p:tnLst>
+      <p:par>
+        <p:cTn id="1" dur="indefinite" restart="never" nodeType="tmRoot"/>
+      </p:par>
+    </p:tnLst>
+  </p:timing>
+</p:sld>
+</file>
+
+<file path=ppt/slides/slide12.xml><?xml version="1.0" encoding="utf-8"?>
+<p:sld xmlns:a="http://schemas.openxmlformats.org/drawingml/2006/main" xmlns:r="http://schemas.openxmlformats.org/officeDocument/2006/relationships" xmlns:p="http://schemas.openxmlformats.org/presentationml/2006/main">
+  <p:cSld>
+    <p:spTree>
+      <p:nvGrpSpPr>
+        <p:cNvPr id="1" name=""/>
+        <p:cNvGrpSpPr/>
+        <p:nvPr/>
+      </p:nvGrpSpPr>
+      <p:grpSpPr>
+        <a:xfrm>
+          <a:off x="0" y="0"/>
+          <a:ext cx="0" cy="0"/>
+          <a:chOff x="0" y="0"/>
+          <a:chExt cx="0" cy="0"/>
+        </a:xfrm>
+      </p:grpSpPr>
+      <p:sp>
+        <p:nvSpPr>
+          <p:cNvPr id="2" name="Title 1"/>
+          <p:cNvSpPr>
+            <a:spLocks noGrp="1"/>
+          </p:cNvSpPr>
+          <p:nvPr>
+            <p:ph type="title"/>
+          </p:nvPr>
+        </p:nvSpPr>
+        <p:spPr>
+          <a:xfrm>
+            <a:off x="457200" y="990600"/>
+            <a:ext cx="8229600" cy="1066800"/>
+          </a:xfrm>
+        </p:spPr>
+        <p:txBody>
+          <a:bodyPr/>
+          <a:lstStyle/>
+          <a:p>
+            <a:r>
               <a:rPr lang="en-US" dirty="0" smtClean="0"/>
               <a:t>Defensive Goals</a:t>
             </a:r>
@@ -4699,7 +5770,7 @@
 </p:sld>
 </file>
 
-<file path=ppt/slides/slide12.xml><?xml version="1.0" encoding="utf-8"?>
+<file path=ppt/slides/slide13.xml><?xml version="1.0" encoding="utf-8"?>
 <p:sld xmlns:a="http://schemas.openxmlformats.org/drawingml/2006/main" xmlns:r="http://schemas.openxmlformats.org/officeDocument/2006/relationships" xmlns:p="http://schemas.openxmlformats.org/presentationml/2006/main">
   <p:cSld>
     <p:spTree>
@@ -9760,7 +10831,7 @@
             </a:r>
             <a:r>
               <a:rPr lang="en-US" dirty="0" smtClean="0"/>
-              <a:t>Model (Exploitation)</a:t>
+              <a:t>Model (Getting Selected)</a:t>
             </a:r>
             <a:endParaRPr lang="en-US" dirty="0"/>
           </a:p>
@@ -9795,31 +10866,7 @@
             </a:r>
             <a:r>
               <a:rPr lang="en-US" dirty="0" smtClean="0"/>
-              <a:t>agrees to forward traffic on a route from </a:t>
-            </a:r>
-            <a:r>
-              <a:rPr lang="en-US" dirty="0">
-                <a:solidFill>
-                  <a:srgbClr val="00B0F0"/>
-                </a:solidFill>
-              </a:rPr>
-              <a:t>Node A </a:t>
-            </a:r>
-            <a:r>
-              <a:rPr lang="en-US" dirty="0"/>
-              <a:t>to </a:t>
-            </a:r>
-            <a:r>
-              <a:rPr lang="en-US" dirty="0">
-                <a:solidFill>
-                  <a:srgbClr val="00B050"/>
-                </a:solidFill>
-              </a:rPr>
-              <a:t>Node B</a:t>
-            </a:r>
-            <a:r>
-              <a:rPr lang="en-US" dirty="0" smtClean="0"/>
-              <a:t>.</a:t>
+              <a:t>spoofs the RREP in order to get selected as the shortest path.</a:t>
             </a:r>
             <a:endParaRPr lang="en-US" dirty="0"/>
           </a:p>
@@ -10863,6 +11910,44 @@
           </a:fontRef>
         </p:style>
       </p:cxnSp>
+      <p:sp>
+        <p:nvSpPr>
+          <p:cNvPr id="23" name="TextBox 22"/>
+          <p:cNvSpPr txBox="1"/>
+          <p:nvPr/>
+        </p:nvSpPr>
+        <p:spPr>
+          <a:xfrm>
+            <a:off x="4267200" y="3886200"/>
+            <a:ext cx="1941526" cy="276999"/>
+          </a:xfrm>
+          <a:prstGeom prst="rect">
+            <a:avLst/>
+          </a:prstGeom>
+          <a:noFill/>
+        </p:spPr>
+        <p:txBody>
+          <a:bodyPr wrap="square" rtlCol="0">
+            <a:spAutoFit/>
+          </a:bodyPr>
+          <a:lstStyle/>
+          <a:p>
+            <a:r>
+              <a:rPr lang="en-US" sz="1200" dirty="0" smtClean="0"/>
+              <a:t>I </a:t>
+            </a:r>
+            <a:r>
+              <a:rPr lang="en-US" sz="1200" smtClean="0"/>
+              <a:t>am Zero </a:t>
+            </a:r>
+            <a:r>
+              <a:rPr lang="en-US" sz="1200" dirty="0" smtClean="0"/>
+              <a:t>Hops from B</a:t>
+            </a:r>
+            <a:endParaRPr lang="en-US" sz="1200" dirty="0"/>
+          </a:p>
+        </p:txBody>
+      </p:sp>
     </p:spTree>
     <p:extLst>
       <p:ext uri="{BB962C8B-B14F-4D97-AF65-F5344CB8AC3E}">
@@ -10926,7 +12011,7 @@
             </a:r>
             <a:r>
               <a:rPr lang="en-US" dirty="0" smtClean="0"/>
-              <a:t>Model (Exploitation)</a:t>
+              <a:t>Model (Getting Selected)</a:t>
             </a:r>
             <a:endParaRPr lang="en-US" dirty="0"/>
           </a:p>
@@ -10949,7 +12034,7 @@
           <a:p>
             <a:r>
               <a:rPr lang="en-US" dirty="0" smtClean="0"/>
-              <a:t>The </a:t>
+              <a:t>A pair of </a:t>
             </a:r>
             <a:r>
               <a:rPr lang="en-US" dirty="0" smtClean="0">
@@ -10957,11 +12042,11 @@
                   <a:srgbClr val="FF0000"/>
                 </a:solidFill>
               </a:rPr>
-              <a:t>captured node </a:t>
+              <a:t>captured nodes </a:t>
             </a:r>
             <a:r>
               <a:rPr lang="en-US" dirty="0" smtClean="0"/>
-              <a:t>drops all packets rather than forwarding them.</a:t>
+              <a:t>create a fake tunnel to make it likely that they are selected as the shortest path.</a:t>
             </a:r>
             <a:endParaRPr lang="en-US" dirty="0"/>
           </a:p>
@@ -10969,7 +12054,7 @@
       </p:sp>
       <p:sp>
         <p:nvSpPr>
-          <p:cNvPr id="31" name="Oval 30"/>
+          <p:cNvPr id="4" name="Oval 3"/>
           <p:cNvSpPr/>
           <p:nvPr/>
         </p:nvSpPr>
@@ -11016,7 +12101,7 @@
       </p:sp>
       <p:sp>
         <p:nvSpPr>
-          <p:cNvPr id="33" name="Oval 32"/>
+          <p:cNvPr id="5" name="Oval 4"/>
           <p:cNvSpPr/>
           <p:nvPr/>
         </p:nvSpPr>
@@ -11056,7 +12141,7 @@
       </p:sp>
       <p:sp>
         <p:nvSpPr>
-          <p:cNvPr id="34" name="Oval 33"/>
+          <p:cNvPr id="6" name="Oval 5"/>
           <p:cNvSpPr/>
           <p:nvPr/>
         </p:nvSpPr>
@@ -11099,7 +12184,7 @@
       </p:sp>
       <p:sp>
         <p:nvSpPr>
-          <p:cNvPr id="36" name="Oval 35"/>
+          <p:cNvPr id="7" name="Oval 6"/>
           <p:cNvSpPr/>
           <p:nvPr/>
         </p:nvSpPr>
@@ -11139,7 +12224,7 @@
       </p:sp>
       <p:sp>
         <p:nvSpPr>
-          <p:cNvPr id="38" name="Oval 37"/>
+          <p:cNvPr id="8" name="Oval 7"/>
           <p:cNvSpPr/>
           <p:nvPr/>
         </p:nvSpPr>
@@ -11179,7 +12264,7 @@
       </p:sp>
       <p:sp>
         <p:nvSpPr>
-          <p:cNvPr id="40" name="Oval 39"/>
+          <p:cNvPr id="9" name="Oval 8"/>
           <p:cNvSpPr/>
           <p:nvPr/>
         </p:nvSpPr>
@@ -11219,7 +12304,7 @@
       </p:sp>
       <p:sp>
         <p:nvSpPr>
-          <p:cNvPr id="42" name="Oval 41"/>
+          <p:cNvPr id="10" name="Oval 9"/>
           <p:cNvSpPr/>
           <p:nvPr/>
         </p:nvSpPr>
@@ -11259,7 +12344,7 @@
       </p:sp>
       <p:sp>
         <p:nvSpPr>
-          <p:cNvPr id="44" name="Oval 43"/>
+          <p:cNvPr id="11" name="Oval 10"/>
           <p:cNvSpPr/>
           <p:nvPr/>
         </p:nvSpPr>
@@ -11302,7 +12387,7 @@
       </p:sp>
       <p:sp>
         <p:nvSpPr>
-          <p:cNvPr id="45" name="Oval 44"/>
+          <p:cNvPr id="12" name="Oval 11"/>
           <p:cNvSpPr/>
           <p:nvPr/>
         </p:nvSpPr>
@@ -11345,7 +12430,7 @@
       </p:sp>
       <p:sp>
         <p:nvSpPr>
-          <p:cNvPr id="46" name="Oval 45"/>
+          <p:cNvPr id="13" name="Oval 12"/>
           <p:cNvSpPr/>
           <p:nvPr/>
         </p:nvSpPr>
@@ -11385,7 +12470,7 @@
       </p:sp>
       <p:sp>
         <p:nvSpPr>
-          <p:cNvPr id="47" name="Oval 46"/>
+          <p:cNvPr id="14" name="Oval 13"/>
           <p:cNvSpPr/>
           <p:nvPr/>
         </p:nvSpPr>
@@ -11425,7 +12510,7 @@
       </p:sp>
       <p:sp>
         <p:nvSpPr>
-          <p:cNvPr id="48" name="Oval 47"/>
+          <p:cNvPr id="15" name="Oval 14"/>
           <p:cNvSpPr/>
           <p:nvPr/>
         </p:nvSpPr>
@@ -11465,7 +12550,7 @@
       </p:sp>
       <p:sp>
         <p:nvSpPr>
-          <p:cNvPr id="49" name="Oval 48"/>
+          <p:cNvPr id="16" name="Oval 15"/>
           <p:cNvSpPr/>
           <p:nvPr/>
         </p:nvSpPr>
@@ -11505,7 +12590,7 @@
       </p:sp>
       <p:sp>
         <p:nvSpPr>
-          <p:cNvPr id="50" name="Oval 49"/>
+          <p:cNvPr id="17" name="Oval 16"/>
           <p:cNvSpPr/>
           <p:nvPr/>
         </p:nvSpPr>
@@ -11545,7 +12630,7 @@
       </p:sp>
       <p:sp>
         <p:nvSpPr>
-          <p:cNvPr id="51" name="Oval 50"/>
+          <p:cNvPr id="18" name="Oval 17"/>
           <p:cNvSpPr/>
           <p:nvPr/>
         </p:nvSpPr>
@@ -11585,7 +12670,7 @@
       </p:sp>
       <p:sp>
         <p:nvSpPr>
-          <p:cNvPr id="52" name="Oval 51"/>
+          <p:cNvPr id="19" name="Oval 18"/>
           <p:cNvSpPr/>
           <p:nvPr/>
         </p:nvSpPr>
@@ -11632,7 +12717,7 @@
       </p:sp>
       <p:sp>
         <p:nvSpPr>
-          <p:cNvPr id="53" name="Oval 52"/>
+          <p:cNvPr id="20" name="Oval 19"/>
           <p:cNvSpPr/>
           <p:nvPr/>
         </p:nvSpPr>
@@ -11675,7 +12760,7 @@
       </p:sp>
       <p:sp>
         <p:nvSpPr>
-          <p:cNvPr id="54" name="Oval 53"/>
+          <p:cNvPr id="21" name="Oval 20"/>
           <p:cNvSpPr/>
           <p:nvPr/>
         </p:nvSpPr>
@@ -11715,7 +12800,7 @@
       </p:sp>
       <p:sp>
         <p:nvSpPr>
-          <p:cNvPr id="55" name="Oval 54"/>
+          <p:cNvPr id="22" name="Oval 21"/>
           <p:cNvSpPr/>
           <p:nvPr/>
         </p:nvSpPr>
@@ -11755,17 +12840,17 @@
       </p:sp>
       <p:cxnSp>
         <p:nvCxnSpPr>
-          <p:cNvPr id="56" name="Straight Arrow Connector 55"/>
+          <p:cNvPr id="30" name="Straight Arrow Connector 29"/>
           <p:cNvCxnSpPr>
-            <a:stCxn id="31" idx="6"/>
-            <a:endCxn id="36" idx="2"/>
+            <a:stCxn id="4" idx="6"/>
+            <a:endCxn id="6" idx="2"/>
           </p:cNvCxnSpPr>
           <p:nvPr/>
         </p:nvCxnSpPr>
         <p:spPr>
-          <a:xfrm>
-            <a:off x="990600" y="4457700"/>
-            <a:ext cx="533400" cy="45657"/>
+          <a:xfrm flipV="1">
+            <a:off x="990600" y="4152900"/>
+            <a:ext cx="609600" cy="304800"/>
           </a:xfrm>
           <a:prstGeom prst="straightConnector1">
             <a:avLst/>
@@ -11791,17 +12876,17 @@
       </p:cxnSp>
       <p:cxnSp>
         <p:nvCxnSpPr>
-          <p:cNvPr id="57" name="Straight Arrow Connector 56"/>
+          <p:cNvPr id="41" name="Straight Arrow Connector 40"/>
           <p:cNvCxnSpPr>
-            <a:stCxn id="36" idx="6"/>
-            <a:endCxn id="42" idx="2"/>
+            <a:stCxn id="11" idx="6"/>
+            <a:endCxn id="16" idx="1"/>
           </p:cNvCxnSpPr>
           <p:nvPr/>
         </p:nvCxnSpPr>
         <p:spPr>
-          <a:xfrm>
-            <a:off x="1752600" y="4503357"/>
-            <a:ext cx="609600" cy="68958"/>
+          <a:xfrm flipV="1">
+            <a:off x="4267200" y="4872178"/>
+            <a:ext cx="1024078" cy="385622"/>
           </a:xfrm>
           <a:prstGeom prst="straightConnector1">
             <a:avLst/>
@@ -11827,17 +12912,17 @@
       </p:cxnSp>
       <p:cxnSp>
         <p:nvCxnSpPr>
-          <p:cNvPr id="58" name="Straight Arrow Connector 57"/>
+          <p:cNvPr id="43" name="Straight Arrow Connector 42"/>
           <p:cNvCxnSpPr>
-            <a:stCxn id="42" idx="6"/>
-            <a:endCxn id="50" idx="3"/>
+            <a:stCxn id="16" idx="6"/>
+            <a:endCxn id="19" idx="3"/>
           </p:cNvCxnSpPr>
           <p:nvPr/>
         </p:nvCxnSpPr>
         <p:spPr>
           <a:xfrm flipV="1">
-            <a:off x="2590800" y="4302680"/>
-            <a:ext cx="1048009" cy="269635"/>
+            <a:off x="5486400" y="4790423"/>
+            <a:ext cx="376378" cy="162577"/>
           </a:xfrm>
           <a:prstGeom prst="straightConnector1">
             <a:avLst/>
@@ -11863,80 +12948,74 @@
       </p:cxnSp>
       <p:cxnSp>
         <p:nvCxnSpPr>
-          <p:cNvPr id="59" name="Straight Arrow Connector 58"/>
+          <p:cNvPr id="25" name="Straight Arrow Connector 24"/>
           <p:cNvCxnSpPr>
-            <a:stCxn id="50" idx="7"/>
-            <a:endCxn id="51" idx="3"/>
+            <a:stCxn id="6" idx="7"/>
+            <a:endCxn id="11" idx="1"/>
           </p:cNvCxnSpPr>
           <p:nvPr/>
         </p:nvCxnSpPr>
         <p:spPr>
-          <a:xfrm flipV="1">
-            <a:off x="3800453" y="4119737"/>
-            <a:ext cx="128986" cy="21299"/>
+          <a:xfrm>
+            <a:off x="1795322" y="4072078"/>
+            <a:ext cx="2276756" cy="1104900"/>
           </a:xfrm>
           <a:prstGeom prst="straightConnector1">
             <a:avLst/>
           </a:prstGeom>
           <a:ln>
-            <a:tailEnd type="arrow"/>
+            <a:tailEnd type="triangle"/>
           </a:ln>
         </p:spPr>
         <p:style>
-          <a:lnRef idx="1">
-            <a:schemeClr val="accent1"/>
+          <a:lnRef idx="2">
+            <a:schemeClr val="accent5"/>
           </a:lnRef>
           <a:fillRef idx="0">
-            <a:schemeClr val="accent1"/>
-          </a:fillRef>
-          <a:effectRef idx="0">
-            <a:schemeClr val="accent1"/>
+            <a:schemeClr val="accent5"/>
+          </a:fillRef>
+          <a:effectRef idx="1">
+            <a:schemeClr val="accent5"/>
           </a:effectRef>
           <a:fontRef idx="minor">
             <a:schemeClr val="tx1"/>
           </a:fontRef>
         </p:style>
       </p:cxnSp>
-      <p:cxnSp>
-        <p:nvCxnSpPr>
-          <p:cNvPr id="60" name="Straight Arrow Connector 59"/>
-          <p:cNvCxnSpPr>
-            <a:stCxn id="51" idx="6"/>
-            <a:endCxn id="45" idx="1"/>
-          </p:cNvCxnSpPr>
-          <p:nvPr/>
-        </p:nvCxnSpPr>
-        <p:spPr>
-          <a:xfrm>
-            <a:off x="4124561" y="4038915"/>
-            <a:ext cx="633317" cy="261763"/>
-          </a:xfrm>
-          <a:prstGeom prst="straightConnector1">
-            <a:avLst/>
-          </a:prstGeom>
-          <a:ln>
-            <a:tailEnd type="arrow"/>
-          </a:ln>
-        </p:spPr>
-        <p:style>
-          <a:lnRef idx="1">
-            <a:schemeClr val="accent1"/>
-          </a:lnRef>
-          <a:fillRef idx="0">
-            <a:schemeClr val="accent1"/>
-          </a:fillRef>
-          <a:effectRef idx="0">
-            <a:schemeClr val="accent1"/>
-          </a:effectRef>
-          <a:fontRef idx="minor">
-            <a:schemeClr val="tx1"/>
-          </a:fontRef>
-        </p:style>
-      </p:cxnSp>
+      <p:sp>
+        <p:nvSpPr>
+          <p:cNvPr id="29" name="TextBox 28"/>
+          <p:cNvSpPr txBox="1"/>
+          <p:nvPr/>
+        </p:nvSpPr>
+        <p:spPr>
+          <a:xfrm>
+            <a:off x="2325511" y="3967652"/>
+            <a:ext cx="1004984" cy="461665"/>
+          </a:xfrm>
+          <a:prstGeom prst="rect">
+            <a:avLst/>
+          </a:prstGeom>
+          <a:noFill/>
+        </p:spPr>
+        <p:txBody>
+          <a:bodyPr wrap="square" rtlCol="0">
+            <a:spAutoFit/>
+          </a:bodyPr>
+          <a:lstStyle/>
+          <a:p>
+            <a:r>
+              <a:rPr lang="en-US" sz="1200" dirty="0" smtClean="0"/>
+              <a:t>Fake Connection</a:t>
+            </a:r>
+            <a:endParaRPr lang="en-US" sz="1200" dirty="0"/>
+          </a:p>
+        </p:txBody>
+      </p:sp>
     </p:spTree>
     <p:extLst>
       <p:ext uri="{BB962C8B-B14F-4D97-AF65-F5344CB8AC3E}">
-        <p14:creationId xmlns:p14="http://schemas.microsoft.com/office/powerpoint/2010/main" val="3011107067"/>
+        <p14:creationId xmlns:p14="http://schemas.microsoft.com/office/powerpoint/2010/main" val="1426193763"/>
       </p:ext>
     </p:extLst>
   </p:cSld>

</xml_diff>